<commit_message>
Update SE03_FSE_DL_WORKSHOP presentation with new content
</commit_message>
<xml_diff>
--- a/slides/SE03_FSE_DL_WORKSHOP.pptx
+++ b/slides/SE03_FSE_DL_WORKSHOP.pptx
@@ -10,10 +10,10 @@
   <p:sldIdLst>
     <p:sldId id="491" r:id="rId5"/>
     <p:sldId id="510" r:id="rId6"/>
-    <p:sldId id="513" r:id="rId7"/>
-    <p:sldId id="514" r:id="rId8"/>
-    <p:sldId id="512" r:id="rId9"/>
-    <p:sldId id="515" r:id="rId10"/>
+    <p:sldId id="514" r:id="rId7"/>
+    <p:sldId id="513" r:id="rId8"/>
+    <p:sldId id="515" r:id="rId9"/>
+    <p:sldId id="512" r:id="rId10"/>
     <p:sldId id="516" r:id="rId11"/>
     <p:sldId id="517" r:id="rId12"/>
     <p:sldId id="518" r:id="rId13"/>
@@ -222,7 +222,7 @@
           <a:p>
             <a:fld id="{3C6FA5EA-0E1E-4764-B5B7-A47DCC3A898E}" type="datetimeFigureOut">
               <a:rPr lang="en-US" smtClean="0"/>
-              <a:t>4/16/2025</a:t>
+              <a:t>4/22/2025</a:t>
             </a:fld>
             <a:endParaRPr lang="en-US" dirty="0"/>
           </a:p>
@@ -529,7 +529,7 @@
           <a:p>
             <a:fld id="{2ABAD28B-DD56-4B56-883A-96608C765E28}" type="datetimeFigureOut">
               <a:rPr lang="en-US" smtClean="0"/>
-              <a:t>4/16/2025</a:t>
+              <a:t>4/22/2025</a:t>
             </a:fld>
             <a:endParaRPr lang="en-US" dirty="0"/>
           </a:p>
@@ -848,7 +848,7 @@
           <a:p>
             <a:fld id="{2ABAD28B-DD56-4B56-883A-96608C765E28}" type="datetimeFigureOut">
               <a:rPr lang="en-US" smtClean="0"/>
-              <a:t>4/16/2025</a:t>
+              <a:t>4/22/2025</a:t>
             </a:fld>
             <a:endParaRPr lang="en-US" dirty="0"/>
           </a:p>
@@ -961,7 +961,7 @@
           <a:p>
             <a:fld id="{8027B902-09B5-4324-8310-59625360F035}" type="datetime1">
               <a:rPr lang="en-US" smtClean="0"/>
-              <a:t>4/16/2025</a:t>
+              <a:t>4/22/2025</a:t>
             </a:fld>
             <a:endParaRPr lang="en-US" dirty="0"/>
           </a:p>
@@ -1251,7 +1251,7 @@
           <a:p>
             <a:fld id="{2ABAD28B-DD56-4B56-883A-96608C765E28}" type="datetimeFigureOut">
               <a:rPr lang="en-US" smtClean="0"/>
-              <a:t>4/16/2025</a:t>
+              <a:t>4/22/2025</a:t>
             </a:fld>
             <a:endParaRPr lang="en-US" dirty="0"/>
           </a:p>
@@ -1542,7 +1542,7 @@
           <a:p>
             <a:fld id="{E6B19A73-9EF0-435E-951F-A4ACE59FBD85}" type="datetime1">
               <a:rPr lang="en-US" smtClean="0"/>
-              <a:t>4/16/2025</a:t>
+              <a:t>4/22/2025</a:t>
             </a:fld>
             <a:endParaRPr lang="en-US" dirty="0"/>
           </a:p>
@@ -1879,7 +1879,7 @@
           <a:p>
             <a:fld id="{C72BE8CE-6011-4887-8688-8D57691F11AD}" type="datetime1">
               <a:rPr lang="en-US" smtClean="0"/>
-              <a:t>4/16/2025</a:t>
+              <a:t>4/22/2025</a:t>
             </a:fld>
             <a:endParaRPr lang="en-US" dirty="0"/>
           </a:p>
@@ -2277,7 +2277,7 @@
           <a:p>
             <a:fld id="{886426EA-0386-4881-8D6D-3F08C95C4A7F}" type="datetime1">
               <a:rPr lang="en-US" smtClean="0"/>
-              <a:t>4/16/2025</a:t>
+              <a:t>4/22/2025</a:t>
             </a:fld>
             <a:endParaRPr lang="en-US" dirty="0"/>
           </a:p>
@@ -2666,7 +2666,7 @@
           <a:p>
             <a:fld id="{1FE1A989-42EF-40B2-87AB-6941C231CD4A}" type="datetime1">
               <a:rPr lang="en-US" smtClean="0"/>
-              <a:t>4/16/2025</a:t>
+              <a:t>4/22/2025</a:t>
             </a:fld>
             <a:endParaRPr lang="en-US" dirty="0"/>
           </a:p>
@@ -2973,7 +2973,7 @@
           <a:p>
             <a:fld id="{EEE2A7A0-B9EE-41A8-8016-28E5803F20B2}" type="datetime1">
               <a:rPr lang="en-US" smtClean="0"/>
-              <a:t>4/16/2025</a:t>
+              <a:t>4/22/2025</a:t>
             </a:fld>
             <a:endParaRPr lang="en-US" dirty="0"/>
           </a:p>
@@ -3221,7 +3221,7 @@
           <a:p>
             <a:fld id="{8A60B404-9532-4DA8-8A40-EC339A5BE635}" type="datetime1">
               <a:rPr lang="en-US" smtClean="0"/>
-              <a:t>4/16/2025</a:t>
+              <a:t>4/22/2025</a:t>
             </a:fld>
             <a:endParaRPr lang="en-US" dirty="0"/>
           </a:p>
@@ -3459,7 +3459,7 @@
           <a:p>
             <a:fld id="{8A60B404-9532-4DA8-8A40-EC339A5BE635}" type="datetime1">
               <a:rPr lang="en-US" smtClean="0"/>
-              <a:t>4/16/2025</a:t>
+              <a:t>4/22/2025</a:t>
             </a:fld>
             <a:endParaRPr lang="en-US" dirty="0"/>
           </a:p>
@@ -3744,7 +3744,7 @@
           <a:p>
             <a:fld id="{2ABAD28B-DD56-4B56-883A-96608C765E28}" type="datetimeFigureOut">
               <a:rPr lang="en-US" smtClean="0"/>
-              <a:t>4/16/2025</a:t>
+              <a:t>4/22/2025</a:t>
             </a:fld>
             <a:endParaRPr lang="en-US" dirty="0"/>
           </a:p>
@@ -4063,7 +4063,7 @@
           <a:p>
             <a:fld id="{EEE6A364-A39C-470E-B89A-9BD899585684}" type="datetime1">
               <a:rPr lang="en-US" smtClean="0"/>
-              <a:t>4/16/2025</a:t>
+              <a:t>4/22/2025</a:t>
             </a:fld>
             <a:endParaRPr lang="en-US" dirty="0"/>
           </a:p>
@@ -4323,7 +4323,7 @@
           <a:p>
             <a:fld id="{B11C69CE-4771-4BFA-AD70-0E51ABA58D6D}" type="datetime1">
               <a:rPr lang="en-US" smtClean="0"/>
-              <a:t>4/16/2025</a:t>
+              <a:t>4/22/2025</a:t>
             </a:fld>
             <a:endParaRPr lang="en-US" dirty="0"/>
           </a:p>
@@ -4540,7 +4540,7 @@
           <a:p>
             <a:fld id="{990E4242-8CA0-457D-B3B1-7D78B4164321}" type="datetime1">
               <a:rPr lang="en-US" smtClean="0"/>
-              <a:t>4/16/2025</a:t>
+              <a:t>4/22/2025</a:t>
             </a:fld>
             <a:endParaRPr lang="en-US" dirty="0"/>
           </a:p>
@@ -4741,7 +4741,7 @@
           <a:p>
             <a:fld id="{F53D6F41-6645-4089-A6BB-7B692A44A4CC}" type="datetime1">
               <a:rPr lang="en-US" smtClean="0"/>
-              <a:t>4/16/2025</a:t>
+              <a:t>4/22/2025</a:t>
             </a:fld>
             <a:endParaRPr lang="en-US" dirty="0"/>
           </a:p>
@@ -4981,7 +4981,7 @@
           <a:p>
             <a:fld id="{258B73AF-3955-4569-8B4F-B329360A9CBD}" type="datetime1">
               <a:rPr lang="en-US" smtClean="0"/>
-              <a:t>4/16/2025</a:t>
+              <a:t>4/22/2025</a:t>
             </a:fld>
             <a:endParaRPr lang="en-US" dirty="0"/>
           </a:p>
@@ -5199,7 +5199,7 @@
           <a:p>
             <a:fld id="{8695276D-BBED-48BC-B459-1E9A16CF46CD}" type="datetime1">
               <a:rPr lang="en-US" smtClean="0"/>
-              <a:t>4/16/2025</a:t>
+              <a:t>4/22/2025</a:t>
             </a:fld>
             <a:endParaRPr lang="en-US" dirty="0"/>
           </a:p>
@@ -5418,7 +5418,7 @@
           <a:p>
             <a:fld id="{FD138C57-8E3B-4697-92F8-0ED9B71F7E17}" type="datetime1">
               <a:rPr lang="en-US" smtClean="0"/>
-              <a:t>4/16/2025</a:t>
+              <a:t>4/22/2025</a:t>
             </a:fld>
             <a:endParaRPr lang="en-US" dirty="0"/>
           </a:p>
@@ -5636,7 +5636,7 @@
           <a:p>
             <a:fld id="{B0ADC593-EA98-4C39-A75F-3F3A9C691019}" type="datetime1">
               <a:rPr lang="en-US" smtClean="0"/>
-              <a:t>4/16/2025</a:t>
+              <a:t>4/22/2025</a:t>
             </a:fld>
             <a:endParaRPr lang="en-US" dirty="0"/>
           </a:p>
@@ -5945,7 +5945,7 @@
           <a:p>
             <a:fld id="{8FACD271-2BB0-4C13-9E3A-50B90F57CA5B}" type="datetime1">
               <a:rPr lang="en-US" smtClean="0"/>
-              <a:t>4/16/2025</a:t>
+              <a:t>4/22/2025</a:t>
             </a:fld>
             <a:endParaRPr lang="en-US" dirty="0"/>
           </a:p>
@@ -6307,7 +6307,7 @@
           <a:p>
             <a:fld id="{9C4109C0-CC82-467C-B6E8-62D4D3634E2A}" type="datetime1">
               <a:rPr lang="en-US" smtClean="0"/>
-              <a:t>4/16/2025</a:t>
+              <a:t>4/22/2025</a:t>
             </a:fld>
             <a:endParaRPr lang="en-US" dirty="0"/>
           </a:p>
@@ -6668,7 +6668,7 @@
           <a:p>
             <a:fld id="{2ABAD28B-DD56-4B56-883A-96608C765E28}" type="datetimeFigureOut">
               <a:rPr lang="en-US" smtClean="0"/>
-              <a:t>4/16/2025</a:t>
+              <a:t>4/22/2025</a:t>
             </a:fld>
             <a:endParaRPr lang="en-US" dirty="0"/>
           </a:p>
@@ -6900,7 +6900,7 @@
           <a:p>
             <a:fld id="{1A5F77D0-C28E-4573-88F0-0A30FF98888E}" type="datetime1">
               <a:rPr lang="en-US" smtClean="0"/>
-              <a:t>4/16/2025</a:t>
+              <a:t>4/22/2025</a:t>
             </a:fld>
             <a:endParaRPr lang="en-US" dirty="0"/>
           </a:p>
@@ -7261,7 +7261,7 @@
           <a:p>
             <a:fld id="{D1F1191D-5EC4-40DF-9DB6-A6385AB88B55}" type="datetime1">
               <a:rPr lang="en-US" smtClean="0"/>
-              <a:t>4/16/2025</a:t>
+              <a:t>4/22/2025</a:t>
             </a:fld>
             <a:endParaRPr lang="en-US" dirty="0"/>
           </a:p>
@@ -7593,7 +7593,7 @@
           <a:p>
             <a:fld id="{EE468DAA-49F6-4492-82E6-75555EB31418}" type="datetime1">
               <a:rPr lang="en-US" smtClean="0"/>
-              <a:t>4/16/2025</a:t>
+              <a:t>4/22/2025</a:t>
             </a:fld>
             <a:endParaRPr lang="en-US" dirty="0"/>
           </a:p>
@@ -7906,7 +7906,7 @@
           <a:p>
             <a:fld id="{41D22668-A3AE-429F-A351-A1583BA90793}" type="datetime1">
               <a:rPr lang="en-US" smtClean="0"/>
-              <a:t>4/16/2025</a:t>
+              <a:t>4/22/2025</a:t>
             </a:fld>
             <a:endParaRPr lang="en-US" dirty="0"/>
           </a:p>
@@ -8256,7 +8256,7 @@
           <a:p>
             <a:fld id="{CB3A2E2B-8F4D-437C-9F55-5E913AFC716A}" type="datetime1">
               <a:rPr lang="en-US" smtClean="0"/>
-              <a:t>4/16/2025</a:t>
+              <a:t>4/22/2025</a:t>
             </a:fld>
             <a:endParaRPr lang="en-US" dirty="0"/>
           </a:p>
@@ -8568,7 +8568,7 @@
           <a:p>
             <a:fld id="{46C70014-48FC-4647-9615-BBD39F98887D}" type="datetime1">
               <a:rPr lang="en-US" smtClean="0"/>
-              <a:t>4/16/2025</a:t>
+              <a:t>4/22/2025</a:t>
             </a:fld>
             <a:endParaRPr lang="en-US" dirty="0"/>
           </a:p>
@@ -8907,7 +8907,7 @@
           <a:p>
             <a:fld id="{C089F4EF-3CDF-46D7-ADF4-3A52C84FD8BE}" type="datetime1">
               <a:rPr lang="en-US" smtClean="0"/>
-              <a:t>4/16/2025</a:t>
+              <a:t>4/22/2025</a:t>
             </a:fld>
             <a:endParaRPr lang="en-US" dirty="0"/>
           </a:p>
@@ -9224,7 +9224,7 @@
           <a:p>
             <a:fld id="{E635C43F-DBB1-4D83-B442-E1529AA900C2}" type="datetime1">
               <a:rPr lang="en-US" smtClean="0"/>
-              <a:t>4/16/2025</a:t>
+              <a:t>4/22/2025</a:t>
             </a:fld>
             <a:endParaRPr lang="en-US" dirty="0"/>
           </a:p>
@@ -9574,7 +9574,7 @@
           <a:p>
             <a:fld id="{2D13F81E-C5BD-4314-B9B9-AAE2702F29D2}" type="datetime1">
               <a:rPr lang="en-US" smtClean="0"/>
-              <a:t>4/16/2025</a:t>
+              <a:t>4/22/2025</a:t>
             </a:fld>
             <a:endParaRPr lang="en-US" dirty="0"/>
           </a:p>
@@ -9909,7 +9909,7 @@
           <a:p>
             <a:fld id="{ADC8C146-0A20-4029-98D5-9A42EEDF8B24}" type="datetime1">
               <a:rPr lang="en-US" smtClean="0"/>
-              <a:t>4/16/2025</a:t>
+              <a:t>4/22/2025</a:t>
             </a:fld>
             <a:endParaRPr lang="en-US" dirty="0"/>
           </a:p>
@@ -10261,7 +10261,7 @@
             <a:fld id="{2ABAD28B-DD56-4B56-883A-96608C765E28}" type="datetimeFigureOut">
               <a:rPr lang="en-US" smtClean="0"/>
               <a:pPr/>
-              <a:t>4/16/2025</a:t>
+              <a:t>4/22/2025</a:t>
             </a:fld>
             <a:endParaRPr lang="en-US" dirty="0"/>
           </a:p>
@@ -10606,7 +10606,7 @@
           <a:p>
             <a:fld id="{87C12A2F-57DF-45DA-A7E9-678FD33267B9}" type="datetime1">
               <a:rPr lang="en-US" smtClean="0"/>
-              <a:t>4/16/2025</a:t>
+              <a:t>4/22/2025</a:t>
             </a:fld>
             <a:endParaRPr lang="en-US" dirty="0"/>
           </a:p>
@@ -10950,7 +10950,7 @@
           <a:p>
             <a:fld id="{9128053F-E531-4885-B604-CF1A6DEEE405}" type="datetime1">
               <a:rPr lang="en-US" smtClean="0"/>
-              <a:t>4/16/2025</a:t>
+              <a:t>4/22/2025</a:t>
             </a:fld>
             <a:endParaRPr lang="en-US" dirty="0"/>
           </a:p>
@@ -11253,7 +11253,7 @@
           <a:p>
             <a:fld id="{4766791B-F730-470C-BD5E-FFF8D449589F}" type="datetime1">
               <a:rPr lang="en-US" smtClean="0"/>
-              <a:t>4/16/2025</a:t>
+              <a:t>4/22/2025</a:t>
             </a:fld>
             <a:endParaRPr lang="en-US" dirty="0"/>
           </a:p>
@@ -11517,7 +11517,7 @@
           <a:p>
             <a:fld id="{4E73FE0C-303A-49D2-B22C-9FE8AE7D9EF1}" type="datetime1">
               <a:rPr lang="en-US" smtClean="0"/>
-              <a:t>4/16/2025</a:t>
+              <a:t>4/22/2025</a:t>
             </a:fld>
             <a:endParaRPr lang="en-US" dirty="0"/>
           </a:p>
@@ -11827,7 +11827,7 @@
           <a:p>
             <a:fld id="{D73859A7-84EB-4384-87AF-59CC16704CF8}" type="datetime1">
               <a:rPr lang="en-US" smtClean="0"/>
-              <a:t>4/16/2025</a:t>
+              <a:t>4/22/2025</a:t>
             </a:fld>
             <a:endParaRPr lang="en-US" dirty="0"/>
           </a:p>
@@ -12154,7 +12154,7 @@
             <a:fld id="{E5AD3D17-73C9-402C-91E7-BA73E6829C50}" type="datetime1">
               <a:rPr lang="en-US" smtClean="0"/>
               <a:pPr/>
-              <a:t>4/16/2025</a:t>
+              <a:t>4/22/2025</a:t>
             </a:fld>
             <a:endParaRPr lang="en-US" dirty="0"/>
           </a:p>
@@ -12560,7 +12560,7 @@
             <a:fld id="{C77A7CDD-9512-40CC-9351-FC0DE186CFBD}" type="datetime1">
               <a:rPr lang="en-US" smtClean="0"/>
               <a:pPr/>
-              <a:t>4/16/2025</a:t>
+              <a:t>4/22/2025</a:t>
             </a:fld>
             <a:endParaRPr lang="en-US" dirty="0"/>
           </a:p>
@@ -12888,7 +12888,7 @@
           <a:p>
             <a:fld id="{483EFCC7-B7E8-4ABE-BBCB-C75FD27800CD}" type="datetime1">
               <a:rPr lang="en-US" smtClean="0"/>
-              <a:t>4/16/2025</a:t>
+              <a:t>4/22/2025</a:t>
             </a:fld>
             <a:endParaRPr lang="en-US" dirty="0"/>
           </a:p>
@@ -13129,7 +13129,7 @@
           <a:p>
             <a:fld id="{F140A1F3-DA5D-4F2E-B759-748FF8D0ACA9}" type="datetime1">
               <a:rPr lang="en-US" smtClean="0"/>
-              <a:t>4/16/2025</a:t>
+              <a:t>4/22/2025</a:t>
             </a:fld>
             <a:endParaRPr lang="en-US" dirty="0"/>
           </a:p>
@@ -13425,7 +13425,7 @@
           <a:p>
             <a:fld id="{301B1322-4C31-4D1F-88B1-5F79F56892AE}" type="datetime1">
               <a:rPr lang="en-US" smtClean="0"/>
-              <a:t>4/16/2025</a:t>
+              <a:t>4/22/2025</a:t>
             </a:fld>
             <a:endParaRPr lang="en-US" dirty="0"/>
           </a:p>
@@ -13721,7 +13721,7 @@
           <a:p>
             <a:fld id="{2ABAD28B-DD56-4B56-883A-96608C765E28}" type="datetimeFigureOut">
               <a:rPr lang="en-US" smtClean="0"/>
-              <a:t>4/16/2025</a:t>
+              <a:t>4/22/2025</a:t>
             </a:fld>
             <a:endParaRPr lang="en-US" dirty="0"/>
           </a:p>
@@ -13919,7 +13919,7 @@
           <a:p>
             <a:fld id="{507735E4-737B-43D4-B991-92C3D63DE68F}" type="datetime1">
               <a:rPr lang="en-US" smtClean="0"/>
-              <a:t>4/16/2025</a:t>
+              <a:t>4/22/2025</a:t>
             </a:fld>
             <a:endParaRPr lang="en-US" dirty="0"/>
           </a:p>
@@ -14169,7 +14169,7 @@
           <a:p>
             <a:fld id="{4D63035D-22A0-4334-A9AE-2457016C8B47}" type="datetime1">
               <a:rPr lang="en-US" smtClean="0"/>
-              <a:t>4/16/2025</a:t>
+              <a:t>4/22/2025</a:t>
             </a:fld>
             <a:endParaRPr lang="en-US" dirty="0"/>
           </a:p>
@@ -14483,7 +14483,7 @@
             <a:fld id="{4D63035D-22A0-4334-A9AE-2457016C8B47}" type="datetime1">
               <a:rPr lang="en-US" smtClean="0"/>
               <a:pPr/>
-              <a:t>4/16/2025</a:t>
+              <a:t>4/22/2025</a:t>
             </a:fld>
             <a:endParaRPr lang="en-US" dirty="0"/>
           </a:p>
@@ -14759,7 +14759,7 @@
           <a:p>
             <a:fld id="{29247CA6-BC1D-429A-A289-4E939E49554A}" type="datetime1">
               <a:rPr lang="en-US" smtClean="0"/>
-              <a:t>4/16/2025</a:t>
+              <a:t>4/22/2025</a:t>
             </a:fld>
             <a:endParaRPr lang="en-US" dirty="0"/>
           </a:p>
@@ -15069,7 +15069,7 @@
             <a:fld id="{DF8418BD-2BA9-41CB-AB89-625779A7563D}" type="datetime1">
               <a:rPr lang="en-US" smtClean="0"/>
               <a:pPr/>
-              <a:t>4/16/2025</a:t>
+              <a:t>4/22/2025</a:t>
             </a:fld>
             <a:endParaRPr lang="en-US" dirty="0"/>
           </a:p>
@@ -15340,7 +15340,7 @@
           <a:p>
             <a:fld id="{2ABAD28B-DD56-4B56-883A-96608C765E28}" type="datetimeFigureOut">
               <a:rPr lang="en-US" smtClean="0"/>
-              <a:t>4/16/2025</a:t>
+              <a:t>4/22/2025</a:t>
             </a:fld>
             <a:endParaRPr lang="en-US" dirty="0"/>
           </a:p>
@@ -15655,7 +15655,7 @@
           <a:p>
             <a:fld id="{2ABAD28B-DD56-4B56-883A-96608C765E28}" type="datetimeFigureOut">
               <a:rPr lang="en-US" smtClean="0"/>
-              <a:t>4/16/2025</a:t>
+              <a:t>4/22/2025</a:t>
             </a:fld>
             <a:endParaRPr lang="en-US" dirty="0"/>
           </a:p>
@@ -15962,7 +15962,7 @@
           <a:p>
             <a:fld id="{2ABAD28B-DD56-4B56-883A-96608C765E28}" type="datetimeFigureOut">
               <a:rPr lang="en-US" smtClean="0"/>
-              <a:t>4/16/2025</a:t>
+              <a:t>4/22/2025</a:t>
             </a:fld>
             <a:endParaRPr lang="en-US" dirty="0"/>
           </a:p>
@@ -16167,7 +16167,7 @@
           <a:p>
             <a:fld id="{12DB3EA1-DD0C-4B8D-8364-52024B4530F1}" type="datetime1">
               <a:rPr lang="en-US" smtClean="0"/>
-              <a:t>4/16/2025</a:t>
+              <a:t>4/22/2025</a:t>
             </a:fld>
             <a:endParaRPr lang="en-US" dirty="0"/>
           </a:p>
@@ -16489,7 +16489,7 @@
           <a:p>
             <a:fld id="{3D157344-9CC7-412D-8C20-072BE86D5A11}" type="datetime1">
               <a:rPr lang="en-US" smtClean="0"/>
-              <a:t>4/16/2025</a:t>
+              <a:t>4/22/2025</a:t>
             </a:fld>
             <a:endParaRPr lang="en-US" dirty="0"/>
           </a:p>
@@ -16799,7 +16799,7 @@
           <a:p>
             <a:fld id="{2ABAD28B-DD56-4B56-883A-96608C765E28}" type="datetimeFigureOut">
               <a:rPr lang="en-US" smtClean="0"/>
-              <a:t>4/16/2025</a:t>
+              <a:t>4/22/2025</a:t>
             </a:fld>
             <a:endParaRPr lang="en-US" dirty="0"/>
           </a:p>
@@ -17081,7 +17081,7 @@
           <a:p>
             <a:fld id="{157987AA-E4E6-4FC1-BAD8-09A952212C58}" type="datetime1">
               <a:rPr lang="en-US" smtClean="0"/>
-              <a:t>4/16/2025</a:t>
+              <a:t>4/22/2025</a:t>
             </a:fld>
             <a:endParaRPr lang="en-US" dirty="0"/>
           </a:p>
@@ -17326,7 +17326,7 @@
           <a:p>
             <a:fld id="{043CF65F-0E21-48DE-8D75-4BF66A547E8E}" type="datetime1">
               <a:rPr lang="en-US" smtClean="0"/>
-              <a:t>4/16/2025</a:t>
+              <a:t>4/22/2025</a:t>
             </a:fld>
             <a:endParaRPr lang="en-US" dirty="0"/>
           </a:p>
@@ -17568,7 +17568,7 @@
           <a:p>
             <a:fld id="{2ABAD28B-DD56-4B56-883A-96608C765E28}" type="datetimeFigureOut">
               <a:rPr lang="en-US" smtClean="0"/>
-              <a:t>4/16/2025</a:t>
+              <a:t>4/22/2025</a:t>
             </a:fld>
             <a:endParaRPr lang="en-US" dirty="0"/>
           </a:p>
@@ -17970,7 +17970,7 @@
           <a:p>
             <a:fld id="{2ABAD28B-DD56-4B56-883A-96608C765E28}" type="datetimeFigureOut">
               <a:rPr lang="en-US" smtClean="0"/>
-              <a:t>4/16/2025</a:t>
+              <a:t>4/22/2025</a:t>
             </a:fld>
             <a:endParaRPr lang="en-US" dirty="0"/>
           </a:p>
@@ -18240,7 +18240,7 @@
           <a:p>
             <a:fld id="{2ABAD28B-DD56-4B56-883A-96608C765E28}" type="datetimeFigureOut">
               <a:rPr lang="en-US" smtClean="0"/>
-              <a:t>4/16/2025</a:t>
+              <a:t>4/22/2025</a:t>
             </a:fld>
             <a:endParaRPr lang="en-US" dirty="0"/>
           </a:p>
@@ -18663,7 +18663,7 @@
           <a:p>
             <a:fld id="{2ABAD28B-DD56-4B56-883A-96608C765E28}" type="datetimeFigureOut">
               <a:rPr lang="en-US" smtClean="0"/>
-              <a:t>4/16/2025</a:t>
+              <a:t>4/22/2025</a:t>
             </a:fld>
             <a:endParaRPr lang="en-US" dirty="0"/>
           </a:p>
@@ -18982,7 +18982,7 @@
           <a:p>
             <a:fld id="{2ABAD28B-DD56-4B56-883A-96608C765E28}" type="datetimeFigureOut">
               <a:rPr lang="en-US" smtClean="0"/>
-              <a:t>4/16/2025</a:t>
+              <a:t>4/22/2025</a:t>
             </a:fld>
             <a:endParaRPr lang="en-US" dirty="0"/>
           </a:p>
@@ -19739,114 +19739,6 @@
         <p:cNvPr id="1" name="">
           <a:extLst>
             <a:ext uri="{FF2B5EF4-FFF2-40B4-BE49-F238E27FC236}">
-              <a16:creationId xmlns:a16="http://schemas.microsoft.com/office/drawing/2014/main" id="{03E9DA85-7C8C-F937-041D-8677B29191A8}"/>
-            </a:ext>
-          </a:extLst>
-        </p:cNvPr>
-        <p:cNvGrpSpPr/>
-        <p:nvPr/>
-      </p:nvGrpSpPr>
-      <p:grpSpPr>
-        <a:xfrm>
-          <a:off x="0" y="0"/>
-          <a:ext cx="0" cy="0"/>
-          <a:chOff x="0" y="0"/>
-          <a:chExt cx="0" cy="0"/>
-        </a:xfrm>
-      </p:grpSpPr>
-      <p:pic>
-        <p:nvPicPr>
-          <p:cNvPr id="4" name="Picture 3" descr="A group of colorful lines and dots&#10;&#10;AI-generated content may be incorrect.">
-            <a:extLst>
-              <a:ext uri="{FF2B5EF4-FFF2-40B4-BE49-F238E27FC236}">
-                <a16:creationId xmlns:a16="http://schemas.microsoft.com/office/drawing/2014/main" id="{9F3BBC99-AD89-55F1-31ED-D42C78798502}"/>
-              </a:ext>
-            </a:extLst>
-          </p:cNvPr>
-          <p:cNvPicPr>
-            <a:picLocks noChangeAspect="1"/>
-          </p:cNvPicPr>
-          <p:nvPr/>
-        </p:nvPicPr>
-        <p:blipFill>
-          <a:blip r:embed="rId2">
-            <a:extLst>
-              <a:ext uri="{28A0092B-C50C-407E-A947-70E740481C1C}">
-                <a14:useLocalDpi xmlns:a14="http://schemas.microsoft.com/office/drawing/2010/main" val="0"/>
-              </a:ext>
-            </a:extLst>
-          </a:blip>
-          <a:stretch>
-            <a:fillRect/>
-          </a:stretch>
-        </p:blipFill>
-        <p:spPr>
-          <a:xfrm>
-            <a:off x="6291347" y="1088136"/>
-            <a:ext cx="4622631" cy="5390822"/>
-          </a:xfrm>
-          <a:prstGeom prst="rect">
-            <a:avLst/>
-          </a:prstGeom>
-          <a:noFill/>
-        </p:spPr>
-      </p:pic>
-      <p:sp>
-        <p:nvSpPr>
-          <p:cNvPr id="2" name="Title 1">
-            <a:extLst>
-              <a:ext uri="{FF2B5EF4-FFF2-40B4-BE49-F238E27FC236}">
-                <a16:creationId xmlns:a16="http://schemas.microsoft.com/office/drawing/2014/main" id="{B19095B5-3BB0-6CFB-793A-6BD577B5B203}"/>
-              </a:ext>
-            </a:extLst>
-          </p:cNvPr>
-          <p:cNvSpPr>
-            <a:spLocks noGrp="1"/>
-          </p:cNvSpPr>
-          <p:nvPr>
-            <p:ph type="title"/>
-          </p:nvPr>
-        </p:nvSpPr>
-        <p:spPr>
-          <a:xfrm>
-            <a:off x="1088136" y="1088136"/>
-            <a:ext cx="4142232" cy="4940661"/>
-          </a:xfrm>
-        </p:spPr>
-        <p:txBody>
-          <a:bodyPr anchor="t">
-            <a:normAutofit/>
-          </a:bodyPr>
-          <a:lstStyle/>
-          <a:p>
-            <a:r>
-              <a:rPr lang="en-US" dirty="0"/>
-              <a:t>Activation functions</a:t>
-            </a:r>
-          </a:p>
-        </p:txBody>
-      </p:sp>
-    </p:spTree>
-    <p:extLst>
-      <p:ext uri="{BB962C8B-B14F-4D97-AF65-F5344CB8AC3E}">
-        <p14:creationId xmlns:p14="http://schemas.microsoft.com/office/powerpoint/2010/main" val="788115100"/>
-      </p:ext>
-    </p:extLst>
-  </p:cSld>
-  <p:clrMapOvr>
-    <a:masterClrMapping/>
-  </p:clrMapOvr>
-</p:sld>
-</file>
-
-<file path=ppt/slides/slide4.xml><?xml version="1.0" encoding="utf-8"?>
-<p:sld xmlns:a="http://schemas.openxmlformats.org/drawingml/2006/main" xmlns:r="http://schemas.openxmlformats.org/officeDocument/2006/relationships" xmlns:p="http://schemas.openxmlformats.org/presentationml/2006/main">
-  <p:cSld>
-    <p:spTree>
-      <p:nvGrpSpPr>
-        <p:cNvPr id="1" name="">
-          <a:extLst>
-            <a:ext uri="{FF2B5EF4-FFF2-40B4-BE49-F238E27FC236}">
               <a16:creationId xmlns:a16="http://schemas.microsoft.com/office/drawing/2014/main" id="{241AF82C-85E0-4C67-7682-843D386C17A3}"/>
             </a:ext>
           </a:extLst>
@@ -19947,12 +19839,18 @@
 </p:sld>
 </file>
 
-<file path=ppt/slides/slide5.xml><?xml version="1.0" encoding="utf-8"?>
+<file path=ppt/slides/slide4.xml><?xml version="1.0" encoding="utf-8"?>
 <p:sld xmlns:a="http://schemas.openxmlformats.org/drawingml/2006/main" xmlns:r="http://schemas.openxmlformats.org/officeDocument/2006/relationships" xmlns:p="http://schemas.openxmlformats.org/presentationml/2006/main">
   <p:cSld>
     <p:spTree>
       <p:nvGrpSpPr>
-        <p:cNvPr id="1" name=""/>
+        <p:cNvPr id="1" name="">
+          <a:extLst>
+            <a:ext uri="{FF2B5EF4-FFF2-40B4-BE49-F238E27FC236}">
+              <a16:creationId xmlns:a16="http://schemas.microsoft.com/office/drawing/2014/main" id="{03E9DA85-7C8C-F937-041D-8677B29191A8}"/>
+            </a:ext>
+          </a:extLst>
+        </p:cNvPr>
         <p:cNvGrpSpPr/>
         <p:nvPr/>
       </p:nvGrpSpPr>
@@ -19966,10 +19864,10 @@
       </p:grpSpPr>
       <p:pic>
         <p:nvPicPr>
-          <p:cNvPr id="4" name="Picture 3" descr="A group of colorful lines and dots&#10;&#10;AI-generated content may be incorrect.">
-            <a:extLst>
-              <a:ext uri="{FF2B5EF4-FFF2-40B4-BE49-F238E27FC236}">
-                <a16:creationId xmlns:a16="http://schemas.microsoft.com/office/drawing/2014/main" id="{27C327A3-5E49-C109-9B5C-D39F51485B7C}"/>
+          <p:cNvPr id="5" name="Picture 4">
+            <a:extLst>
+              <a:ext uri="{FF2B5EF4-FFF2-40B4-BE49-F238E27FC236}">
+                <a16:creationId xmlns:a16="http://schemas.microsoft.com/office/drawing/2014/main" id="{198A151B-8BE0-9882-5E41-91A78115BB80}"/>
               </a:ext>
             </a:extLst>
           </p:cNvPr>
@@ -19979,21 +19877,15 @@
           <p:nvPr/>
         </p:nvPicPr>
         <p:blipFill>
-          <a:blip r:embed="rId2">
-            <a:extLst>
-              <a:ext uri="{28A0092B-C50C-407E-A947-70E740481C1C}">
-                <a14:useLocalDpi xmlns:a14="http://schemas.microsoft.com/office/drawing/2010/main" val="0"/>
-              </a:ext>
-            </a:extLst>
-          </a:blip>
+          <a:blip r:embed="rId2"/>
           <a:stretch>
             <a:fillRect/>
           </a:stretch>
         </p:blipFill>
         <p:spPr>
           <a:xfrm>
-            <a:off x="6291347" y="1088136"/>
-            <a:ext cx="4622631" cy="5390822"/>
+            <a:off x="5063319" y="1764888"/>
+            <a:ext cx="6519080" cy="3895150"/>
           </a:xfrm>
           <a:prstGeom prst="rect">
             <a:avLst/>
@@ -20003,10 +19895,40 @@
       </p:pic>
       <p:sp>
         <p:nvSpPr>
+          <p:cNvPr id="10" name="Text Placeholder 2">
+            <a:extLst>
+              <a:ext uri="{FF2B5EF4-FFF2-40B4-BE49-F238E27FC236}">
+                <a16:creationId xmlns:a16="http://schemas.microsoft.com/office/drawing/2014/main" id="{D1618318-2762-48FD-ABF5-29838B5E0CC7}"/>
+              </a:ext>
+            </a:extLst>
+          </p:cNvPr>
+          <p:cNvSpPr>
+            <a:spLocks noGrp="1"/>
+          </p:cNvSpPr>
+          <p:nvPr>
+            <p:ph type="body" sz="half" idx="2"/>
+          </p:nvPr>
+        </p:nvSpPr>
+        <p:spPr>
+          <a:xfrm>
+            <a:off x="1088136" y="3300449"/>
+            <a:ext cx="3585586" cy="2960326"/>
+          </a:xfrm>
+        </p:spPr>
+        <p:txBody>
+          <a:bodyPr/>
+          <a:lstStyle/>
+          <a:p>
+            <a:endParaRPr lang="en-US"/>
+          </a:p>
+        </p:txBody>
+      </p:sp>
+      <p:sp>
+        <p:nvSpPr>
           <p:cNvPr id="2" name="Title 1">
             <a:extLst>
               <a:ext uri="{FF2B5EF4-FFF2-40B4-BE49-F238E27FC236}">
-                <a16:creationId xmlns:a16="http://schemas.microsoft.com/office/drawing/2014/main" id="{943A666D-0C0E-F6D7-80A1-740167DAA049}"/>
+                <a16:creationId xmlns:a16="http://schemas.microsoft.com/office/drawing/2014/main" id="{B19095B5-3BB0-6CFB-793A-6BD577B5B203}"/>
               </a:ext>
             </a:extLst>
           </p:cNvPr>
@@ -20020,7 +19942,7 @@
         <p:spPr>
           <a:xfrm>
             <a:off x="1088136" y="1088136"/>
-            <a:ext cx="4142232" cy="4940661"/>
+            <a:ext cx="3595634" cy="2212313"/>
           </a:xfrm>
         </p:spPr>
         <p:txBody>
@@ -20030,17 +19952,16 @@
           <a:lstStyle/>
           <a:p>
             <a:r>
-              <a:rPr lang="en-US"/>
-              <a:t>Optimiser</a:t>
-            </a:r>
-            <a:endParaRPr lang="en-US" dirty="0"/>
+              <a:rPr lang="en-US" dirty="0"/>
+              <a:t>Activation functions</a:t>
+            </a:r>
           </a:p>
         </p:txBody>
       </p:sp>
     </p:spTree>
     <p:extLst>
       <p:ext uri="{BB962C8B-B14F-4D97-AF65-F5344CB8AC3E}">
-        <p14:creationId xmlns:p14="http://schemas.microsoft.com/office/powerpoint/2010/main" val="1266566367"/>
+        <p14:creationId xmlns:p14="http://schemas.microsoft.com/office/powerpoint/2010/main" val="788115100"/>
       </p:ext>
     </p:extLst>
   </p:cSld>
@@ -20050,7 +19971,7 @@
 </p:sld>
 </file>
 
-<file path=ppt/slides/slide6.xml><?xml version="1.0" encoding="utf-8"?>
+<file path=ppt/slides/slide5.xml><?xml version="1.0" encoding="utf-8"?>
 <p:sld xmlns:a="http://schemas.openxmlformats.org/drawingml/2006/main" xmlns:r="http://schemas.openxmlformats.org/officeDocument/2006/relationships" xmlns:p="http://schemas.openxmlformats.org/presentationml/2006/main">
   <p:cSld>
     <p:spTree>
@@ -20075,10 +19996,10 @@
       </p:grpSpPr>
       <p:pic>
         <p:nvPicPr>
-          <p:cNvPr id="4" name="Picture 3" descr="A group of colorful lines and dots&#10;&#10;AI-generated content may be incorrect.">
-            <a:extLst>
-              <a:ext uri="{FF2B5EF4-FFF2-40B4-BE49-F238E27FC236}">
-                <a16:creationId xmlns:a16="http://schemas.microsoft.com/office/drawing/2014/main" id="{0A65E8E8-2BB9-D844-99BA-F3C1F616C18D}"/>
+          <p:cNvPr id="5" name="Picture 4">
+            <a:extLst>
+              <a:ext uri="{FF2B5EF4-FFF2-40B4-BE49-F238E27FC236}">
+                <a16:creationId xmlns:a16="http://schemas.microsoft.com/office/drawing/2014/main" id="{DABB9F4D-D874-5A40-5583-98F714A2347E}"/>
               </a:ext>
             </a:extLst>
           </p:cNvPr>
@@ -20088,21 +20009,15 @@
           <p:nvPr/>
         </p:nvPicPr>
         <p:blipFill>
-          <a:blip r:embed="rId2">
-            <a:extLst>
-              <a:ext uri="{28A0092B-C50C-407E-A947-70E740481C1C}">
-                <a14:useLocalDpi xmlns:a14="http://schemas.microsoft.com/office/drawing/2010/main" val="0"/>
-              </a:ext>
-            </a:extLst>
-          </a:blip>
+          <a:blip r:embed="rId2"/>
           <a:stretch>
             <a:fillRect/>
           </a:stretch>
         </p:blipFill>
         <p:spPr>
           <a:xfrm>
-            <a:off x="6291347" y="1088136"/>
-            <a:ext cx="4622631" cy="5390822"/>
+            <a:off x="5063319" y="1764888"/>
+            <a:ext cx="6519080" cy="3895150"/>
           </a:xfrm>
           <a:prstGeom prst="rect">
             <a:avLst/>
@@ -20112,6 +20027,36 @@
       </p:pic>
       <p:sp>
         <p:nvSpPr>
+          <p:cNvPr id="15" name="Text Placeholder 2">
+            <a:extLst>
+              <a:ext uri="{FF2B5EF4-FFF2-40B4-BE49-F238E27FC236}">
+                <a16:creationId xmlns:a16="http://schemas.microsoft.com/office/drawing/2014/main" id="{0FA2A026-7CA1-FA97-262C-488BF32B4501}"/>
+              </a:ext>
+            </a:extLst>
+          </p:cNvPr>
+          <p:cNvSpPr>
+            <a:spLocks noGrp="1"/>
+          </p:cNvSpPr>
+          <p:nvPr>
+            <p:ph type="body" sz="half" idx="2"/>
+          </p:nvPr>
+        </p:nvSpPr>
+        <p:spPr>
+          <a:xfrm>
+            <a:off x="1088136" y="3300449"/>
+            <a:ext cx="3585586" cy="2960326"/>
+          </a:xfrm>
+        </p:spPr>
+        <p:txBody>
+          <a:bodyPr/>
+          <a:lstStyle/>
+          <a:p>
+            <a:endParaRPr lang="en-US"/>
+          </a:p>
+        </p:txBody>
+      </p:sp>
+      <p:sp>
+        <p:nvSpPr>
           <p:cNvPr id="2" name="Title 1">
             <a:extLst>
               <a:ext uri="{FF2B5EF4-FFF2-40B4-BE49-F238E27FC236}">
@@ -20129,7 +20074,7 @@
         <p:spPr>
           <a:xfrm>
             <a:off x="1088136" y="1088136"/>
-            <a:ext cx="4142232" cy="4940661"/>
+            <a:ext cx="3595634" cy="2212313"/>
           </a:xfrm>
         </p:spPr>
         <p:txBody>
@@ -20149,6 +20094,102 @@
     <p:extLst>
       <p:ext uri="{BB962C8B-B14F-4D97-AF65-F5344CB8AC3E}">
         <p14:creationId xmlns:p14="http://schemas.microsoft.com/office/powerpoint/2010/main" val="2038953064"/>
+      </p:ext>
+    </p:extLst>
+  </p:cSld>
+  <p:clrMapOvr>
+    <a:masterClrMapping/>
+  </p:clrMapOvr>
+</p:sld>
+</file>
+
+<file path=ppt/slides/slide6.xml><?xml version="1.0" encoding="utf-8"?>
+<p:sld xmlns:a="http://schemas.openxmlformats.org/drawingml/2006/main" xmlns:r="http://schemas.openxmlformats.org/officeDocument/2006/relationships" xmlns:p="http://schemas.openxmlformats.org/presentationml/2006/main">
+  <p:cSld>
+    <p:spTree>
+      <p:nvGrpSpPr>
+        <p:cNvPr id="1" name=""/>
+        <p:cNvGrpSpPr/>
+        <p:nvPr/>
+      </p:nvGrpSpPr>
+      <p:grpSpPr>
+        <a:xfrm>
+          <a:off x="0" y="0"/>
+          <a:ext cx="0" cy="0"/>
+          <a:chOff x="0" y="0"/>
+          <a:chExt cx="0" cy="0"/>
+        </a:xfrm>
+      </p:grpSpPr>
+      <p:sp>
+        <p:nvSpPr>
+          <p:cNvPr id="2" name="Title 1">
+            <a:extLst>
+              <a:ext uri="{FF2B5EF4-FFF2-40B4-BE49-F238E27FC236}">
+                <a16:creationId xmlns:a16="http://schemas.microsoft.com/office/drawing/2014/main" id="{943A666D-0C0E-F6D7-80A1-740167DAA049}"/>
+              </a:ext>
+            </a:extLst>
+          </p:cNvPr>
+          <p:cNvSpPr>
+            <a:spLocks noGrp="1"/>
+          </p:cNvSpPr>
+          <p:nvPr>
+            <p:ph type="title"/>
+          </p:nvPr>
+        </p:nvSpPr>
+        <p:spPr>
+          <a:xfrm>
+            <a:off x="1088136" y="1088136"/>
+            <a:ext cx="4142232" cy="4940661"/>
+          </a:xfrm>
+        </p:spPr>
+        <p:txBody>
+          <a:bodyPr anchor="t">
+            <a:normAutofit/>
+          </a:bodyPr>
+          <a:lstStyle/>
+          <a:p>
+            <a:r>
+              <a:rPr lang="en-US"/>
+              <a:t>Optimiser</a:t>
+            </a:r>
+            <a:endParaRPr lang="en-US" dirty="0"/>
+          </a:p>
+        </p:txBody>
+      </p:sp>
+      <p:pic>
+        <p:nvPicPr>
+          <p:cNvPr id="5" name="Picture 4">
+            <a:extLst>
+              <a:ext uri="{FF2B5EF4-FFF2-40B4-BE49-F238E27FC236}">
+                <a16:creationId xmlns:a16="http://schemas.microsoft.com/office/drawing/2014/main" id="{FB3C53B6-2F66-27CB-B1D3-936A7824E0E7}"/>
+              </a:ext>
+            </a:extLst>
+          </p:cNvPr>
+          <p:cNvPicPr>
+            <a:picLocks noChangeAspect="1"/>
+          </p:cNvPicPr>
+          <p:nvPr/>
+        </p:nvPicPr>
+        <p:blipFill>
+          <a:blip r:embed="rId2"/>
+          <a:stretch>
+            <a:fillRect/>
+          </a:stretch>
+        </p:blipFill>
+        <p:spPr>
+          <a:xfrm>
+            <a:off x="5149516" y="1143000"/>
+            <a:ext cx="6524433" cy="5521760"/>
+          </a:xfrm>
+          <a:prstGeom prst="rect">
+            <a:avLst/>
+          </a:prstGeom>
+        </p:spPr>
+      </p:pic>
+    </p:spTree>
+    <p:extLst>
+      <p:ext uri="{BB962C8B-B14F-4D97-AF65-F5344CB8AC3E}">
+        <p14:creationId xmlns:p14="http://schemas.microsoft.com/office/powerpoint/2010/main" val="1266566367"/>
       </p:ext>
     </p:extLst>
   </p:cSld>
@@ -20181,43 +20222,6 @@
           <a:chExt cx="0" cy="0"/>
         </a:xfrm>
       </p:grpSpPr>
-      <p:pic>
-        <p:nvPicPr>
-          <p:cNvPr id="4" name="Picture 3" descr="A group of colorful lines and dots&#10;&#10;AI-generated content may be incorrect.">
-            <a:extLst>
-              <a:ext uri="{FF2B5EF4-FFF2-40B4-BE49-F238E27FC236}">
-                <a16:creationId xmlns:a16="http://schemas.microsoft.com/office/drawing/2014/main" id="{88AB0C15-74F6-C135-E563-D8B71E82C55D}"/>
-              </a:ext>
-            </a:extLst>
-          </p:cNvPr>
-          <p:cNvPicPr>
-            <a:picLocks noChangeAspect="1"/>
-          </p:cNvPicPr>
-          <p:nvPr/>
-        </p:nvPicPr>
-        <p:blipFill>
-          <a:blip r:embed="rId2">
-            <a:extLst>
-              <a:ext uri="{28A0092B-C50C-407E-A947-70E740481C1C}">
-                <a14:useLocalDpi xmlns:a14="http://schemas.microsoft.com/office/drawing/2010/main" val="0"/>
-              </a:ext>
-            </a:extLst>
-          </a:blip>
-          <a:stretch>
-            <a:fillRect/>
-          </a:stretch>
-        </p:blipFill>
-        <p:spPr>
-          <a:xfrm>
-            <a:off x="6291347" y="1088136"/>
-            <a:ext cx="4622631" cy="5390822"/>
-          </a:xfrm>
-          <a:prstGeom prst="rect">
-            <a:avLst/>
-          </a:prstGeom>
-          <a:noFill/>
-        </p:spPr>
-      </p:pic>
       <p:sp>
         <p:nvSpPr>
           <p:cNvPr id="2" name="Title 1">
@@ -20979,6 +20983,15 @@
 </file>
 
 <file path=customXml/item1.xml><?xml version="1.0" encoding="utf-8"?>
+<?mso-contentType ?>
+<FormTemplates xmlns="http://schemas.microsoft.com/sharepoint/v3/contenttype/forms">
+  <Display>DocumentLibraryForm</Display>
+  <Edit>DocumentLibraryForm</Edit>
+  <New>DocumentLibraryForm</New>
+</FormTemplates>
+</file>
+
+<file path=customXml/item2.xml><?xml version="1.0" encoding="utf-8"?>
 <ct:contentTypeSchema xmlns:ct="http://schemas.microsoft.com/office/2006/metadata/contentType" xmlns:ma="http://schemas.microsoft.com/office/2006/metadata/properties/metaAttributes" ct:_="" ma:_="" ma:contentTypeName="Document" ma:contentTypeID="0x01010079F111ED35F8CC479449609E8A0923A6" ma:contentTypeVersion="30" ma:contentTypeDescription="Create a new document." ma:contentTypeScope="" ma:versionID="cec0622158e8f13124e9e8fd4de31bd1">
   <xsd:schema xmlns:xsd="http://www.w3.org/2001/XMLSchema" xmlns:xs="http://www.w3.org/2001/XMLSchema" xmlns:p="http://schemas.microsoft.com/office/2006/metadata/properties" xmlns:ns1="http://schemas.microsoft.com/sharepoint/v3" xmlns:ns2="71af3243-3dd4-4a8d-8c0d-dd76da1f02a5" xmlns:ns3="16c05727-aa75-4e4a-9b5f-8a80a1165891" xmlns:ns4="230e9df3-be65-4c73-a93b-d1236ebd677e" targetNamespace="http://schemas.microsoft.com/office/2006/metadata/properties" ma:root="true" ma:fieldsID="3b52f30ab005d15df08657af532e6e38" ns1:_="" ns2:_="" ns3:_="" ns4:_="">
     <xsd:import namespace="http://schemas.microsoft.com/sharepoint/v3"/>
@@ -21296,15 +21309,6 @@
 </ct:contentTypeSchema>
 </file>
 
-<file path=customXml/item2.xml><?xml version="1.0" encoding="utf-8"?>
-<?mso-contentType ?>
-<FormTemplates xmlns="http://schemas.microsoft.com/sharepoint/v3/contenttype/forms">
-  <Display>DocumentLibraryForm</Display>
-  <Edit>DocumentLibraryForm</Edit>
-  <New>DocumentLibraryForm</New>
-</FormTemplates>
-</file>
-
 <file path=customXml/item3.xml><?xml version="1.0" encoding="utf-8"?>
 <p:properties xmlns:p="http://schemas.microsoft.com/office/2006/metadata/properties" xmlns:xsi="http://www.w3.org/2001/XMLSchema-instance" xmlns:pc="http://schemas.microsoft.com/office/infopath/2007/PartnerControls">
   <documentManagement>
@@ -21326,6 +21330,14 @@
 </file>
 
 <file path=customXml/itemProps1.xml><?xml version="1.0" encoding="utf-8"?>
+<ds:datastoreItem xmlns:ds="http://schemas.openxmlformats.org/officeDocument/2006/customXml" ds:itemID="{3416ACBC-C288-4FE2-A121-1047B4270A61}">
+  <ds:schemaRefs>
+    <ds:schemaRef ds:uri="http://schemas.microsoft.com/sharepoint/v3/contenttype/forms"/>
+  </ds:schemaRefs>
+</ds:datastoreItem>
+</file>
+
+<file path=customXml/itemProps2.xml><?xml version="1.0" encoding="utf-8"?>
 <ds:datastoreItem xmlns:ds="http://schemas.openxmlformats.org/officeDocument/2006/customXml" ds:itemID="{8D147B0A-A3D1-43B0-B0BE-D6581D3609D1}">
   <ds:schemaRefs>
     <ds:schemaRef ds:uri="http://schemas.microsoft.com/office/2006/metadata/contentType"/>
@@ -21346,14 +21358,6 @@
 </ds:datastoreItem>
 </file>
 
-<file path=customXml/itemProps2.xml><?xml version="1.0" encoding="utf-8"?>
-<ds:datastoreItem xmlns:ds="http://schemas.openxmlformats.org/officeDocument/2006/customXml" ds:itemID="{3416ACBC-C288-4FE2-A121-1047B4270A61}">
-  <ds:schemaRefs>
-    <ds:schemaRef ds:uri="http://schemas.microsoft.com/sharepoint/v3/contenttype/forms"/>
-  </ds:schemaRefs>
-</ds:datastoreItem>
-</file>
-
 <file path=customXml/itemProps3.xml><?xml version="1.0" encoding="utf-8"?>
 <ds:datastoreItem xmlns:ds="http://schemas.openxmlformats.org/officeDocument/2006/customXml" ds:itemID="{AA9D4D66-A82C-4C14-A5CE-108788051B7D}">
   <ds:schemaRefs>

</xml_diff>

<commit_message>
Remove unused notebook SE07_CA_Transformers.ipynb and update presentation slides SE03_FSE_DL_WORKSHOP.pptx
</commit_message>
<xml_diff>
--- a/slides/SE03_FSE_DL_WORKSHOP.pptx
+++ b/slides/SE03_FSE_DL_WORKSHOP.pptx
@@ -20983,15 +20983,6 @@
 </file>
 
 <file path=customXml/item1.xml><?xml version="1.0" encoding="utf-8"?>
-<?mso-contentType ?>
-<FormTemplates xmlns="http://schemas.microsoft.com/sharepoint/v3/contenttype/forms">
-  <Display>DocumentLibraryForm</Display>
-  <Edit>DocumentLibraryForm</Edit>
-  <New>DocumentLibraryForm</New>
-</FormTemplates>
-</file>
-
-<file path=customXml/item2.xml><?xml version="1.0" encoding="utf-8"?>
 <ct:contentTypeSchema xmlns:ct="http://schemas.microsoft.com/office/2006/metadata/contentType" xmlns:ma="http://schemas.microsoft.com/office/2006/metadata/properties/metaAttributes" ct:_="" ma:_="" ma:contentTypeName="Document" ma:contentTypeID="0x01010079F111ED35F8CC479449609E8A0923A6" ma:contentTypeVersion="30" ma:contentTypeDescription="Create a new document." ma:contentTypeScope="" ma:versionID="cec0622158e8f13124e9e8fd4de31bd1">
   <xsd:schema xmlns:xsd="http://www.w3.org/2001/XMLSchema" xmlns:xs="http://www.w3.org/2001/XMLSchema" xmlns:p="http://schemas.microsoft.com/office/2006/metadata/properties" xmlns:ns1="http://schemas.microsoft.com/sharepoint/v3" xmlns:ns2="71af3243-3dd4-4a8d-8c0d-dd76da1f02a5" xmlns:ns3="16c05727-aa75-4e4a-9b5f-8a80a1165891" xmlns:ns4="230e9df3-be65-4c73-a93b-d1236ebd677e" targetNamespace="http://schemas.microsoft.com/office/2006/metadata/properties" ma:root="true" ma:fieldsID="3b52f30ab005d15df08657af532e6e38" ns1:_="" ns2:_="" ns3:_="" ns4:_="">
     <xsd:import namespace="http://schemas.microsoft.com/sharepoint/v3"/>
@@ -21309,6 +21300,15 @@
 </ct:contentTypeSchema>
 </file>
 
+<file path=customXml/item2.xml><?xml version="1.0" encoding="utf-8"?>
+<?mso-contentType ?>
+<FormTemplates xmlns="http://schemas.microsoft.com/sharepoint/v3/contenttype/forms">
+  <Display>DocumentLibraryForm</Display>
+  <Edit>DocumentLibraryForm</Edit>
+  <New>DocumentLibraryForm</New>
+</FormTemplates>
+</file>
+
 <file path=customXml/item3.xml><?xml version="1.0" encoding="utf-8"?>
 <p:properties xmlns:p="http://schemas.microsoft.com/office/2006/metadata/properties" xmlns:xsi="http://www.w3.org/2001/XMLSchema-instance" xmlns:pc="http://schemas.microsoft.com/office/infopath/2007/PartnerControls">
   <documentManagement>
@@ -21330,14 +21330,6 @@
 </file>
 
 <file path=customXml/itemProps1.xml><?xml version="1.0" encoding="utf-8"?>
-<ds:datastoreItem xmlns:ds="http://schemas.openxmlformats.org/officeDocument/2006/customXml" ds:itemID="{3416ACBC-C288-4FE2-A121-1047B4270A61}">
-  <ds:schemaRefs>
-    <ds:schemaRef ds:uri="http://schemas.microsoft.com/sharepoint/v3/contenttype/forms"/>
-  </ds:schemaRefs>
-</ds:datastoreItem>
-</file>
-
-<file path=customXml/itemProps2.xml><?xml version="1.0" encoding="utf-8"?>
 <ds:datastoreItem xmlns:ds="http://schemas.openxmlformats.org/officeDocument/2006/customXml" ds:itemID="{8D147B0A-A3D1-43B0-B0BE-D6581D3609D1}">
   <ds:schemaRefs>
     <ds:schemaRef ds:uri="http://schemas.microsoft.com/office/2006/metadata/contentType"/>
@@ -21358,6 +21350,14 @@
 </ds:datastoreItem>
 </file>
 
+<file path=customXml/itemProps2.xml><?xml version="1.0" encoding="utf-8"?>
+<ds:datastoreItem xmlns:ds="http://schemas.openxmlformats.org/officeDocument/2006/customXml" ds:itemID="{3416ACBC-C288-4FE2-A121-1047B4270A61}">
+  <ds:schemaRefs>
+    <ds:schemaRef ds:uri="http://schemas.microsoft.com/sharepoint/v3/contenttype/forms"/>
+  </ds:schemaRefs>
+</ds:datastoreItem>
+</file>
+
 <file path=customXml/itemProps3.xml><?xml version="1.0" encoding="utf-8"?>
 <ds:datastoreItem xmlns:ds="http://schemas.openxmlformats.org/officeDocument/2006/customXml" ds:itemID="{AA9D4D66-A82C-4C14-A5CE-108788051B7D}">
   <ds:schemaRefs>

</xml_diff>